<commit_message>
typo correct in fellows ppt
</commit_message>
<xml_diff>
--- a/global_supplement/exercises/OHIoverview_fellows_week2.pptx
+++ b/global_supplement/exercises/OHIoverview_fellows_week2.pptx
@@ -3664,7 +3664,15 @@
             </a:pPr>
             <a:r>
               <a:rPr lang="en-US" smtClean="0"/>
-              <a:t>factors that help preserve and pretect the goal (i.e., resilience)</a:t>
+              <a:t>factors that help preserve and </a:t>
+            </a:r>
+            <a:r>
+              <a:rPr lang="en-US" smtClean="0"/>
+              <a:t>protect </a:t>
+            </a:r>
+            <a:r>
+              <a:rPr lang="en-US" smtClean="0"/>
+              <a:t>the goal (i.e., resilience)</a:t>
             </a:r>
             <a:endParaRPr lang="en-US"/>
           </a:p>
@@ -5512,7 +5520,15 @@
           <a:p>
             <a:r>
               <a:rPr lang="en-US" sz="2400" smtClean="0"/>
-              <a:t>We are also working on including some visulazation functions (NOTE: This could be a side project)</a:t>
+              <a:t>We are also working on including some </a:t>
+            </a:r>
+            <a:r>
+              <a:rPr lang="en-US" sz="2400" smtClean="0"/>
+              <a:t>visualization </a:t>
+            </a:r>
+            <a:r>
+              <a:rPr lang="en-US" sz="2400" smtClean="0"/>
+              <a:t>functions (NOTE: This could be a side project)</a:t>
             </a:r>
           </a:p>
           <a:p>

</xml_diff>